<commit_message>
added screen shots to presentation
</commit_message>
<xml_diff>
--- a/Test-Document/TEST_PPT_2.0.pptx
+++ b/Test-Document/TEST_PPT_2.0.pptx
@@ -167,26 +167,41 @@
   </p:defaultTextStyle>
   <p:extLst>
     <p:ext uri="{521415D9-36F7-43E2-AB2F-B90AF26B5E84}">
-      <p14:sectionLst xmlns:p14="http://schemas.microsoft.com/office/powerpoint/2010/main" xmlns="">
+      <p14:sectionLst xmlns:p14="http://schemas.microsoft.com/office/powerpoint/2010/main">
         <p14:section name="Default Section" id="{8A3E1658-6C17-4D90-9BBE-6F05D47B3FC7}">
           <p14:sldIdLst>
             <p14:sldId id="273"/>
+            <p14:sldId id="735"/>
             <p14:sldId id="702"/>
             <p14:sldId id="708"/>
-            <p14:sldId id="732"/>
-            <p14:sldId id="709"/>
+            <p14:sldId id="736"/>
+            <p14:sldId id="737"/>
+            <p14:sldId id="738"/>
+            <p14:sldId id="739"/>
+            <p14:sldId id="740"/>
             <p14:sldId id="712"/>
             <p14:sldId id="731"/>
             <p14:sldId id="713"/>
             <p14:sldId id="714"/>
             <p14:sldId id="721"/>
             <p14:sldId id="716"/>
+            <p14:sldId id="733"/>
+            <p14:sldId id="734"/>
+            <p14:sldId id="741"/>
+            <p14:sldId id="742"/>
+            <p14:sldId id="743"/>
+            <p14:sldId id="744"/>
+            <p14:sldId id="745"/>
+            <p14:sldId id="750"/>
+            <p14:sldId id="748"/>
+            <p14:sldId id="749"/>
+            <p14:sldId id="751"/>
           </p14:sldIdLst>
         </p14:section>
       </p14:sectionLst>
     </p:ext>
     <p:ext uri="{EFAFB233-063F-42B5-8137-9DF3F51BA10A}">
-      <p15:sldGuideLst xmlns:p15="http://schemas.microsoft.com/office/powerpoint/2012/main" xmlns="">
+      <p15:sldGuideLst xmlns:p15="http://schemas.microsoft.com/office/powerpoint/2012/main">
         <p15:guide id="1" orient="horz" pos="2160">
           <p15:clr>
             <a:srgbClr val="A4A3A4"/>
@@ -200,7 +215,7 @@
       </p15:sldGuideLst>
     </p:ext>
     <p:ext uri="{2D200454-40CA-4A62-9FC3-DE9A4176ACB9}">
-      <p15:notesGuideLst xmlns:p15="http://schemas.microsoft.com/office/powerpoint/2012/main" xmlns="">
+      <p15:notesGuideLst xmlns:p15="http://schemas.microsoft.com/office/powerpoint/2012/main">
         <p15:guide id="1" orient="horz" pos="2880">
           <p15:clr>
             <a:srgbClr val="A4A3A4"/>
@@ -382,7 +397,7 @@
     </p:spTree>
     <p:extLst>
       <p:ext uri="{BB962C8B-B14F-4D97-AF65-F5344CB8AC3E}">
-        <p14:creationId xmlns:p14="http://schemas.microsoft.com/office/powerpoint/2010/main" xmlns="" val="1659632688"/>
+        <p14:creationId xmlns:p14="http://schemas.microsoft.com/office/powerpoint/2010/main" val="1659632688"/>
       </p:ext>
     </p:extLst>
   </p:cSld>
@@ -728,7 +743,7 @@
     </p:spTree>
     <p:extLst>
       <p:ext uri="{BB962C8B-B14F-4D97-AF65-F5344CB8AC3E}">
-        <p14:creationId xmlns:p14="http://schemas.microsoft.com/office/powerpoint/2010/main" xmlns="" val="304638418"/>
+        <p14:creationId xmlns:p14="http://schemas.microsoft.com/office/powerpoint/2010/main" val="304638418"/>
       </p:ext>
     </p:extLst>
   </p:cSld>
@@ -961,7 +976,7 @@
     </p:spTree>
     <p:extLst>
       <p:ext uri="{BB962C8B-B14F-4D97-AF65-F5344CB8AC3E}">
-        <p14:creationId xmlns:p14="http://schemas.microsoft.com/office/powerpoint/2010/main" xmlns="" val="563154991"/>
+        <p14:creationId xmlns:p14="http://schemas.microsoft.com/office/powerpoint/2010/main" val="563154991"/>
       </p:ext>
     </p:extLst>
   </p:cSld>
@@ -1354,7 +1369,7 @@
     </p:spTree>
     <p:extLst>
       <p:ext uri="{BB962C8B-B14F-4D97-AF65-F5344CB8AC3E}">
-        <p14:creationId xmlns:p14="http://schemas.microsoft.com/office/powerpoint/2010/main" xmlns="" val="2241997550"/>
+        <p14:creationId xmlns:p14="http://schemas.microsoft.com/office/powerpoint/2010/main" val="2241997550"/>
       </p:ext>
     </p:extLst>
   </p:cSld>
@@ -1772,7 +1787,7 @@
     </p:spTree>
     <p:extLst>
       <p:ext uri="{BB962C8B-B14F-4D97-AF65-F5344CB8AC3E}">
-        <p14:creationId xmlns:p14="http://schemas.microsoft.com/office/powerpoint/2010/main" xmlns="" val="675535124"/>
+        <p14:creationId xmlns:p14="http://schemas.microsoft.com/office/powerpoint/2010/main" val="675535124"/>
       </p:ext>
     </p:extLst>
   </p:cSld>
@@ -3618,7 +3633,7 @@
           <p:cNvPr id="3" name="Title 2">
             <a:extLst>
               <a:ext uri="{FF2B5EF4-FFF2-40B4-BE49-F238E27FC236}">
-                <a16:creationId xmlns:a16="http://schemas.microsoft.com/office/drawing/2014/main" xmlns="" id="{906C4C2C-591D-C447-9DC3-AB08999E305F}"/>
+                <a16:creationId xmlns="" xmlns:a16="http://schemas.microsoft.com/office/drawing/2014/main" id="{906C4C2C-591D-C447-9DC3-AB08999E305F}"/>
               </a:ext>
             </a:extLst>
           </p:cNvPr>
@@ -3650,7 +3665,7 @@
           <p:cNvPr id="10" name="内容占位符 6">
             <a:extLst>
               <a:ext uri="{FF2B5EF4-FFF2-40B4-BE49-F238E27FC236}">
-                <a16:creationId xmlns:a16="http://schemas.microsoft.com/office/drawing/2014/main" xmlns="" id="{087E18F4-B783-3E48-9BA5-5A5221748E08}"/>
+                <a16:creationId xmlns="" xmlns:a16="http://schemas.microsoft.com/office/drawing/2014/main" id="{087E18F4-B783-3E48-9BA5-5A5221748E08}"/>
               </a:ext>
             </a:extLst>
           </p:cNvPr>
@@ -3734,7 +3749,7 @@
           <p:cNvPr id="11" name="页脚占位符 5">
             <a:extLst>
               <a:ext uri="{FF2B5EF4-FFF2-40B4-BE49-F238E27FC236}">
-                <a16:creationId xmlns:a16="http://schemas.microsoft.com/office/drawing/2014/main" xmlns="" id="{7826FA71-DDDB-B54C-ABBF-D3507E027C72}"/>
+                <a16:creationId xmlns="" xmlns:a16="http://schemas.microsoft.com/office/drawing/2014/main" id="{7826FA71-DDDB-B54C-ABBF-D3507E027C72}"/>
               </a:ext>
             </a:extLst>
           </p:cNvPr>
@@ -3768,7 +3783,7 @@
     </p:spTree>
     <p:extLst>
       <p:ext uri="{BB962C8B-B14F-4D97-AF65-F5344CB8AC3E}">
-        <p14:creationId xmlns:p14="http://schemas.microsoft.com/office/powerpoint/2010/main" xmlns="" val="4187205687"/>
+        <p14:creationId xmlns:p14="http://schemas.microsoft.com/office/powerpoint/2010/main" val="4187205687"/>
       </p:ext>
     </p:extLst>
   </p:cSld>
@@ -3800,7 +3815,7 @@
           <p:cNvPr id="5" name="Slide Number Placeholder 4">
             <a:extLst>
               <a:ext uri="{FF2B5EF4-FFF2-40B4-BE49-F238E27FC236}">
-                <a16:creationId xmlns:a16="http://schemas.microsoft.com/office/drawing/2014/main" xmlns="" id="{A902AA52-EA4D-4E5F-BB50-68CD1B42A04D}"/>
+                <a16:creationId xmlns="" xmlns:a16="http://schemas.microsoft.com/office/drawing/2014/main" id="{A902AA52-EA4D-4E5F-BB50-68CD1B42A04D}"/>
               </a:ext>
             </a:extLst>
           </p:cNvPr>
@@ -3830,7 +3845,7 @@
           <p:cNvPr id="7" name="页脚占位符 5">
             <a:extLst>
               <a:ext uri="{FF2B5EF4-FFF2-40B4-BE49-F238E27FC236}">
-                <a16:creationId xmlns:a16="http://schemas.microsoft.com/office/drawing/2014/main" xmlns="" id="{05A09CBB-638C-4503-B16F-7BE62EC8FC1B}"/>
+                <a16:creationId xmlns="" xmlns:a16="http://schemas.microsoft.com/office/drawing/2014/main" id="{05A09CBB-638C-4503-B16F-7BE62EC8FC1B}"/>
               </a:ext>
             </a:extLst>
           </p:cNvPr>
@@ -3866,7 +3881,7 @@
           <p:cNvPr id="8" name="Picture 7" descr="A screenshot of a social media post&#10;&#10;Description automatically generated">
             <a:extLst>
               <a:ext uri="{FF2B5EF4-FFF2-40B4-BE49-F238E27FC236}">
-                <a16:creationId xmlns:a16="http://schemas.microsoft.com/office/drawing/2014/main" xmlns="" id="{1618E58D-E694-C641-86CC-25D494E90B43}"/>
+                <a16:creationId xmlns="" xmlns:a16="http://schemas.microsoft.com/office/drawing/2014/main" id="{1618E58D-E694-C641-86CC-25D494E90B43}"/>
               </a:ext>
             </a:extLst>
           </p:cNvPr>
@@ -3879,7 +3894,7 @@
           <a:blip r:embed="rId2" cstate="print">
             <a:extLst>
               <a:ext uri="{28A0092B-C50C-407E-A947-70E740481C1C}">
-                <a14:useLocalDpi xmlns:a14="http://schemas.microsoft.com/office/drawing/2010/main" xmlns="" val="0"/>
+                <a14:useLocalDpi xmlns:a14="http://schemas.microsoft.com/office/drawing/2010/main" val="0"/>
               </a:ext>
             </a:extLst>
           </a:blip>
@@ -3900,7 +3915,7 @@
     </p:spTree>
     <p:extLst>
       <p:ext uri="{BB962C8B-B14F-4D97-AF65-F5344CB8AC3E}">
-        <p14:creationId xmlns:p14="http://schemas.microsoft.com/office/powerpoint/2010/main" xmlns="" val="2223807598"/>
+        <p14:creationId xmlns:p14="http://schemas.microsoft.com/office/powerpoint/2010/main" val="2223807598"/>
       </p:ext>
     </p:extLst>
   </p:cSld>
@@ -3956,7 +3971,7 @@
           <p:cNvPr id="3" name="Title 2">
             <a:extLst>
               <a:ext uri="{FF2B5EF4-FFF2-40B4-BE49-F238E27FC236}">
-                <a16:creationId xmlns:a16="http://schemas.microsoft.com/office/drawing/2014/main" xmlns="" id="{906C4C2C-591D-C447-9DC3-AB08999E305F}"/>
+                <a16:creationId xmlns="" xmlns:a16="http://schemas.microsoft.com/office/drawing/2014/main" id="{906C4C2C-591D-C447-9DC3-AB08999E305F}"/>
               </a:ext>
             </a:extLst>
           </p:cNvPr>
@@ -3998,7 +4013,7 @@
           <p:cNvPr id="10" name="内容占位符 6">
             <a:extLst>
               <a:ext uri="{FF2B5EF4-FFF2-40B4-BE49-F238E27FC236}">
-                <a16:creationId xmlns:a16="http://schemas.microsoft.com/office/drawing/2014/main" xmlns="" id="{087E18F4-B783-3E48-9BA5-5A5221748E08}"/>
+                <a16:creationId xmlns="" xmlns:a16="http://schemas.microsoft.com/office/drawing/2014/main" id="{087E18F4-B783-3E48-9BA5-5A5221748E08}"/>
               </a:ext>
             </a:extLst>
           </p:cNvPr>
@@ -4154,7 +4169,7 @@
           <p:cNvPr id="11" name="页脚占位符 5">
             <a:extLst>
               <a:ext uri="{FF2B5EF4-FFF2-40B4-BE49-F238E27FC236}">
-                <a16:creationId xmlns:a16="http://schemas.microsoft.com/office/drawing/2014/main" xmlns="" id="{130A2443-A6B8-7C4D-9C29-CE93DFB9D90E}"/>
+                <a16:creationId xmlns="" xmlns:a16="http://schemas.microsoft.com/office/drawing/2014/main" id="{130A2443-A6B8-7C4D-9C29-CE93DFB9D90E}"/>
               </a:ext>
             </a:extLst>
           </p:cNvPr>
@@ -4188,7 +4203,7 @@
     </p:spTree>
     <p:extLst>
       <p:ext uri="{BB962C8B-B14F-4D97-AF65-F5344CB8AC3E}">
-        <p14:creationId xmlns:p14="http://schemas.microsoft.com/office/powerpoint/2010/main" xmlns="" val="1031506711"/>
+        <p14:creationId xmlns:p14="http://schemas.microsoft.com/office/powerpoint/2010/main" val="1031506711"/>
       </p:ext>
     </p:extLst>
   </p:cSld>
@@ -4244,7 +4259,7 @@
           <p:cNvPr id="9" name="页脚占位符 5">
             <a:extLst>
               <a:ext uri="{FF2B5EF4-FFF2-40B4-BE49-F238E27FC236}">
-                <a16:creationId xmlns:a16="http://schemas.microsoft.com/office/drawing/2014/main" xmlns="" id="{4DEDF4A6-7875-2546-ADC1-6B13F81E3FCD}"/>
+                <a16:creationId xmlns="" xmlns:a16="http://schemas.microsoft.com/office/drawing/2014/main" id="{4DEDF4A6-7875-2546-ADC1-6B13F81E3FCD}"/>
               </a:ext>
             </a:extLst>
           </p:cNvPr>
@@ -4280,7 +4295,7 @@
           <p:cNvPr id="11" name="Picture 10" descr="A screenshot of a social media post&#10;&#10;Description automatically generated">
             <a:extLst>
               <a:ext uri="{FF2B5EF4-FFF2-40B4-BE49-F238E27FC236}">
-                <a16:creationId xmlns:a16="http://schemas.microsoft.com/office/drawing/2014/main" xmlns="" id="{B7EA033E-F387-5945-B1DE-C6B789716B8F}"/>
+                <a16:creationId xmlns="" xmlns:a16="http://schemas.microsoft.com/office/drawing/2014/main" id="{B7EA033E-F387-5945-B1DE-C6B789716B8F}"/>
               </a:ext>
             </a:extLst>
           </p:cNvPr>
@@ -4293,7 +4308,7 @@
           <a:blip r:embed="rId2" cstate="print">
             <a:extLst>
               <a:ext uri="{28A0092B-C50C-407E-A947-70E740481C1C}">
-                <a14:useLocalDpi xmlns:a14="http://schemas.microsoft.com/office/drawing/2010/main" xmlns="" val="0"/>
+                <a14:useLocalDpi xmlns:a14="http://schemas.microsoft.com/office/drawing/2010/main" val="0"/>
               </a:ext>
             </a:extLst>
           </a:blip>
@@ -4314,7 +4329,7 @@
     </p:spTree>
     <p:extLst>
       <p:ext uri="{BB962C8B-B14F-4D97-AF65-F5344CB8AC3E}">
-        <p14:creationId xmlns:p14="http://schemas.microsoft.com/office/powerpoint/2010/main" xmlns="" val="3493956040"/>
+        <p14:creationId xmlns:p14="http://schemas.microsoft.com/office/powerpoint/2010/main" val="3493956040"/>
       </p:ext>
     </p:extLst>
   </p:cSld>
@@ -4346,7 +4361,7 @@
           <p:cNvPr id="10" name="Title 9">
             <a:extLst>
               <a:ext uri="{FF2B5EF4-FFF2-40B4-BE49-F238E27FC236}">
-                <a16:creationId xmlns:a16="http://schemas.microsoft.com/office/drawing/2014/main" xmlns="" id="{2B5BFB35-8AF5-46CC-A872-D3356A1F80B1}"/>
+                <a16:creationId xmlns="" xmlns:a16="http://schemas.microsoft.com/office/drawing/2014/main" id="{2B5BFB35-8AF5-46CC-A872-D3356A1F80B1}"/>
               </a:ext>
             </a:extLst>
           </p:cNvPr>
@@ -4375,7 +4390,7 @@
           <p:cNvPr id="11" name="Content Placeholder 10">
             <a:extLst>
               <a:ext uri="{FF2B5EF4-FFF2-40B4-BE49-F238E27FC236}">
-                <a16:creationId xmlns:a16="http://schemas.microsoft.com/office/drawing/2014/main" xmlns="" id="{539AFC90-3FE6-4AD9-8F1D-7B281069546B}"/>
+                <a16:creationId xmlns="" xmlns:a16="http://schemas.microsoft.com/office/drawing/2014/main" id="{539AFC90-3FE6-4AD9-8F1D-7B281069546B}"/>
               </a:ext>
             </a:extLst>
           </p:cNvPr>
@@ -4480,7 +4495,7 @@
           <p:cNvPr id="9" name="页脚占位符 5">
             <a:extLst>
               <a:ext uri="{FF2B5EF4-FFF2-40B4-BE49-F238E27FC236}">
-                <a16:creationId xmlns:a16="http://schemas.microsoft.com/office/drawing/2014/main" xmlns="" id="{24D79154-874A-A544-A749-2E618D0319A4}"/>
+                <a16:creationId xmlns="" xmlns:a16="http://schemas.microsoft.com/office/drawing/2014/main" id="{24D79154-874A-A544-A749-2E618D0319A4}"/>
               </a:ext>
             </a:extLst>
           </p:cNvPr>
@@ -4509,7 +4524,7 @@
     </p:spTree>
     <p:extLst>
       <p:ext uri="{BB962C8B-B14F-4D97-AF65-F5344CB8AC3E}">
-        <p14:creationId xmlns:p14="http://schemas.microsoft.com/office/powerpoint/2010/main" xmlns="" val="1102200807"/>
+        <p14:creationId xmlns:p14="http://schemas.microsoft.com/office/powerpoint/2010/main" val="1102200807"/>
       </p:ext>
     </p:extLst>
   </p:cSld>
@@ -4565,7 +4580,7 @@
           <p:cNvPr id="7" name="页脚占位符 5">
             <a:extLst>
               <a:ext uri="{FF2B5EF4-FFF2-40B4-BE49-F238E27FC236}">
-                <a16:creationId xmlns:a16="http://schemas.microsoft.com/office/drawing/2014/main" xmlns="" id="{EA3AAAEE-4BB9-7744-A676-537FC9DC9CA0}"/>
+                <a16:creationId xmlns="" xmlns:a16="http://schemas.microsoft.com/office/drawing/2014/main" id="{EA3AAAEE-4BB9-7744-A676-537FC9DC9CA0}"/>
               </a:ext>
             </a:extLst>
           </p:cNvPr>
@@ -4601,7 +4616,7 @@
           <p:cNvPr id="4" name="Picture 3">
             <a:extLst>
               <a:ext uri="{FF2B5EF4-FFF2-40B4-BE49-F238E27FC236}">
-                <a16:creationId xmlns:a16="http://schemas.microsoft.com/office/drawing/2014/main" xmlns="" id="{45211D56-6F5B-074F-91FB-56D29A32683F}"/>
+                <a16:creationId xmlns="" xmlns:a16="http://schemas.microsoft.com/office/drawing/2014/main" id="{45211D56-6F5B-074F-91FB-56D29A32683F}"/>
               </a:ext>
             </a:extLst>
           </p:cNvPr>
@@ -4631,7 +4646,7 @@
           <p:cNvPr id="6" name="Picture 5">
             <a:extLst>
               <a:ext uri="{FF2B5EF4-FFF2-40B4-BE49-F238E27FC236}">
-                <a16:creationId xmlns:a16="http://schemas.microsoft.com/office/drawing/2014/main" xmlns="" id="{11DE9AC7-7AA4-B444-AB8B-E97D246A0C72}"/>
+                <a16:creationId xmlns="" xmlns:a16="http://schemas.microsoft.com/office/drawing/2014/main" id="{11DE9AC7-7AA4-B444-AB8B-E97D246A0C72}"/>
               </a:ext>
             </a:extLst>
           </p:cNvPr>
@@ -4659,7 +4674,7 @@
     </p:spTree>
     <p:extLst>
       <p:ext uri="{BB962C8B-B14F-4D97-AF65-F5344CB8AC3E}">
-        <p14:creationId xmlns:p14="http://schemas.microsoft.com/office/powerpoint/2010/main" xmlns="" val="3387925304"/>
+        <p14:creationId xmlns:p14="http://schemas.microsoft.com/office/powerpoint/2010/main" val="3387925304"/>
       </p:ext>
     </p:extLst>
   </p:cSld>
@@ -4726,11 +4741,7 @@
           <a:p>
             <a:r>
               <a:rPr lang="en-US" altLang="zh-CN" dirty="0" smtClean="0"/>
-              <a:t>This layer </a:t>
-            </a:r>
-            <a:r>
-              <a:rPr lang="en-US" altLang="zh-CN" dirty="0" smtClean="0"/>
-              <a:t>performs a kind of “lateral inhibition” by normalizing over local input regions. In </a:t>
+              <a:t>This layer performs a kind of “lateral inhibition” by normalizing over local input regions. In </a:t>
             </a:r>
             <a:r>
               <a:rPr lang="en-US" altLang="zh-CN" dirty="0" err="1" smtClean="0"/>
@@ -4738,28 +4749,16 @@
             </a:r>
             <a:r>
               <a:rPr lang="en-US" altLang="zh-CN" dirty="0" smtClean="0"/>
-              <a:t> </a:t>
-            </a:r>
+              <a:t> mode, the local regions extend across nearby channels, but have no spatial extent.</a:t>
+            </a:r>
+          </a:p>
+          <a:p>
+            <a:endParaRPr lang="en-US" altLang="zh-CN" dirty="0" smtClean="0"/>
+          </a:p>
+          <a:p>
             <a:r>
               <a:rPr lang="en-US" altLang="zh-CN" dirty="0" smtClean="0"/>
-              <a:t>mode, the local regions extend across nearby channels, but have no spatial extent</a:t>
-            </a:r>
-            <a:r>
-              <a:rPr lang="en-US" altLang="zh-CN" dirty="0" smtClean="0"/>
-              <a:t>.</a:t>
-            </a:r>
-          </a:p>
-          <a:p>
-            <a:endParaRPr lang="en-US" altLang="zh-CN" dirty="0" smtClean="0"/>
-          </a:p>
-          <a:p>
-            <a:r>
-              <a:rPr lang="en-US" altLang="zh-CN" dirty="0" smtClean="0"/>
-              <a:t>For this test we have created this object</a:t>
-            </a:r>
-            <a:r>
-              <a:rPr lang="en-US" altLang="zh-CN" dirty="0" smtClean="0"/>
-              <a:t>:</a:t>
+              <a:t>For this test we have created this object:</a:t>
             </a:r>
           </a:p>
           <a:p>
@@ -4772,19 +4771,13 @@
               <a:rPr lang="en-US" altLang="zh-CN" dirty="0" smtClean="0"/>
               <a:t>: object of local response normalization layer      </a:t>
             </a:r>
-            <a:endParaRPr lang="en-US" altLang="zh-CN" dirty="0" smtClean="0"/>
           </a:p>
           <a:p>
             <a:pPr lvl="1"/>
             <a:r>
               <a:rPr lang="en-US" altLang="zh-CN" dirty="0" smtClean="0"/>
-              <a:t>input</a:t>
-            </a:r>
-            <a:r>
-              <a:rPr lang="en-US" altLang="zh-CN" dirty="0" smtClean="0"/>
-              <a:t>: input image in size 2x2x2x1       </a:t>
-            </a:r>
-            <a:endParaRPr lang="en-US" altLang="zh-CN" dirty="0" smtClean="0"/>
+              <a:t>input: input image in size 2x2x2x1       </a:t>
+            </a:r>
           </a:p>
           <a:p>
             <a:pPr lvl="1"/>
@@ -4800,17 +4793,12 @@
               <a:rPr lang="en-US" altLang="zh-CN" dirty="0" smtClean="0"/>
               <a:t>expected output       </a:t>
             </a:r>
-            <a:endParaRPr lang="en-US" altLang="zh-CN" dirty="0" smtClean="0"/>
           </a:p>
           <a:p>
             <a:pPr lvl="1"/>
             <a:r>
               <a:rPr lang="en-US" altLang="zh-CN" dirty="0" smtClean="0"/>
-              <a:t>output</a:t>
-            </a:r>
-            <a:r>
-              <a:rPr lang="en-US" altLang="zh-CN" dirty="0" smtClean="0"/>
-              <a:t>: output after applying </a:t>
+              <a:t>output: output after applying </a:t>
             </a:r>
             <a:r>
               <a:rPr lang="en-US" altLang="zh-CN" dirty="0" err="1" smtClean="0"/>
@@ -5137,27 +5125,7 @@
           <a:p>
             <a:r>
               <a:rPr lang="en-US" altLang="zh-CN" dirty="0" smtClean="0"/>
-              <a:t>These </a:t>
-            </a:r>
-            <a:r>
-              <a:rPr lang="en-US" altLang="zh-CN" dirty="0" smtClean="0"/>
-              <a:t>classes work directly with the user interface, and provide through it the </a:t>
-            </a:r>
-            <a:r>
-              <a:rPr lang="en-US" altLang="zh-CN" dirty="0" smtClean="0"/>
-              <a:t>input images </a:t>
-            </a:r>
-            <a:r>
-              <a:rPr lang="en-US" altLang="zh-CN" dirty="0" smtClean="0"/>
-              <a:t>and platforms, as well as the mode to the back end , and offer access to </a:t>
-            </a:r>
-            <a:r>
-              <a:rPr lang="en-US" altLang="zh-CN" dirty="0" smtClean="0"/>
-              <a:t>the results</a:t>
-            </a:r>
-            <a:r>
-              <a:rPr lang="en-US" altLang="zh-CN" dirty="0" smtClean="0"/>
-              <a:t>, whether </a:t>
+              <a:t>These classes work directly with the user interface, and provide through it the input images and platforms, as well as the mode to the back end , and offer access to the results, whether </a:t>
             </a:r>
             <a:r>
               <a:rPr lang="en-US" altLang="zh-CN" dirty="0" err="1" smtClean="0"/>
@@ -5306,17 +5274,46 @@
         </p:nvSpPr>
         <p:spPr>
           <a:xfrm>
-            <a:off x="392113" y="1198563"/>
-            <a:ext cx="8356600" cy="821156"/>
+            <a:off x="392113" y="1198562"/>
+            <a:ext cx="4415414" cy="3331874"/>
           </a:xfrm>
         </p:spPr>
         <p:txBody>
-          <a:bodyPr/>
+          <a:bodyPr>
+            <a:normAutofit/>
+          </a:bodyPr>
           <a:lstStyle/>
           <a:p>
             <a:r>
               <a:rPr lang="en-US" altLang="zh-CN" dirty="0" smtClean="0"/>
-              <a:t>The assistant has the input images stored in a map, with their respective paths</a:t>
+              <a:t>The assistant has the input </a:t>
+            </a:r>
+            <a:r>
+              <a:rPr lang="en-US" altLang="zh-CN" dirty="0" smtClean="0"/>
+              <a:t>images</a:t>
+            </a:r>
+          </a:p>
+          <a:p>
+            <a:pPr marL="0" indent="0">
+              <a:buNone/>
+            </a:pPr>
+            <a:r>
+              <a:rPr lang="en-US" altLang="zh-CN" dirty="0" smtClean="0"/>
+              <a:t>stored </a:t>
+            </a:r>
+            <a:r>
+              <a:rPr lang="en-US" altLang="zh-CN" dirty="0" smtClean="0"/>
+              <a:t>in a map, with their respective </a:t>
+            </a:r>
+            <a:endParaRPr lang="en-US" altLang="zh-CN" dirty="0" smtClean="0"/>
+          </a:p>
+          <a:p>
+            <a:pPr marL="0" indent="0" algn="just">
+              <a:buNone/>
+            </a:pPr>
+            <a:r>
+              <a:rPr lang="en-US" altLang="zh-CN" dirty="0" smtClean="0"/>
+              <a:t>paths</a:t>
             </a:r>
             <a:endParaRPr lang="zh-CN" altLang="en-US" dirty="0"/>
           </a:p>
@@ -5395,36 +5392,30 @@
           </a:p>
         </p:txBody>
       </p:sp>
-      <p:sp>
-        <p:nvSpPr>
-          <p:cNvPr id="7" name="TextBox 6"/>
-          <p:cNvSpPr txBox="1"/>
+      <p:pic>
+        <p:nvPicPr>
+          <p:cNvPr id="9" name="Picture 8"/>
+          <p:cNvPicPr>
+            <a:picLocks noChangeAspect="1"/>
+          </p:cNvPicPr>
           <p:nvPr/>
-        </p:nvSpPr>
+        </p:nvPicPr>
+        <p:blipFill>
+          <a:blip r:embed="rId2"/>
+          <a:stretch>
+            <a:fillRect/>
+          </a:stretch>
+        </p:blipFill>
         <p:spPr>
           <a:xfrm>
-            <a:off x="2793441" y="3225521"/>
-            <a:ext cx="4943789" cy="461665"/>
+            <a:off x="4985813" y="1198563"/>
+            <a:ext cx="3762900" cy="4401164"/>
           </a:xfrm>
           <a:prstGeom prst="rect">
             <a:avLst/>
           </a:prstGeom>
-          <a:noFill/>
         </p:spPr>
-        <p:txBody>
-          <a:bodyPr wrap="square" rtlCol="0">
-            <a:spAutoFit/>
-          </a:bodyPr>
-          <a:lstStyle/>
-          <a:p>
-            <a:r>
-              <a:rPr lang="en-US" altLang="zh-CN" sz="2400" b="1" dirty="0" smtClean="0"/>
-              <a:t>Insert Picture here</a:t>
-            </a:r>
-            <a:endParaRPr lang="zh-CN" altLang="en-US" sz="2400" b="1" dirty="0"/>
-          </a:p>
-        </p:txBody>
-      </p:sp>
+      </p:pic>
     </p:spTree>
   </p:cSld>
   <p:clrMapOvr>
@@ -5508,70 +5499,25 @@
           <a:p>
             <a:r>
               <a:rPr lang="en-US" altLang="zh-CN" dirty="0" smtClean="0"/>
-              <a:t>For </a:t>
-            </a:r>
+              <a:t>For the purpose of testing sub-modules and base classes of our program, we configured Google Test on eclipse. </a:t>
+            </a:r>
+          </a:p>
+          <a:p>
+            <a:endParaRPr lang="en-US" altLang="zh-CN" dirty="0" smtClean="0"/>
+          </a:p>
+          <a:p>
             <a:r>
               <a:rPr lang="en-US" altLang="zh-CN" dirty="0" smtClean="0"/>
-              <a:t>the purpose of testing </a:t>
-            </a:r>
+              <a:t>We oriented ourselves as much as possible to the design set during the design phase, and of course, with minor changes, our goal has been mostly achieved, since unit tests are all successful.</a:t>
+            </a:r>
+          </a:p>
+          <a:p>
+            <a:endParaRPr lang="en-US" altLang="zh-CN" dirty="0" smtClean="0"/>
+          </a:p>
+          <a:p>
             <a:r>
               <a:rPr lang="en-US" altLang="zh-CN" dirty="0" smtClean="0"/>
-              <a:t>sub-modules </a:t>
-            </a:r>
-            <a:r>
-              <a:rPr lang="en-US" altLang="zh-CN" dirty="0" smtClean="0"/>
-              <a:t>and base classes of our program, we </a:t>
-            </a:r>
-            <a:r>
-              <a:rPr lang="en-US" altLang="zh-CN" dirty="0" smtClean="0"/>
-              <a:t>configured Google Test </a:t>
-            </a:r>
-            <a:r>
-              <a:rPr lang="en-US" altLang="zh-CN" dirty="0" smtClean="0"/>
-              <a:t>on eclipse. </a:t>
-            </a:r>
-            <a:endParaRPr lang="en-US" altLang="zh-CN" dirty="0" smtClean="0"/>
-          </a:p>
-          <a:p>
-            <a:endParaRPr lang="en-US" altLang="zh-CN" dirty="0" smtClean="0"/>
-          </a:p>
-          <a:p>
-            <a:r>
-              <a:rPr lang="en-US" altLang="zh-CN" dirty="0" smtClean="0"/>
-              <a:t>We oriented ourselves as much as possible to the design set during the design phase, </a:t>
-            </a:r>
-            <a:r>
-              <a:rPr lang="en-US" altLang="zh-CN" dirty="0" smtClean="0"/>
-              <a:t>and of </a:t>
-            </a:r>
-            <a:r>
-              <a:rPr lang="en-US" altLang="zh-CN" dirty="0" smtClean="0"/>
-              <a:t>course, with minor changes, our goal has been mostly achieved, since unit tests are </a:t>
-            </a:r>
-            <a:r>
-              <a:rPr lang="en-US" altLang="zh-CN" dirty="0" smtClean="0"/>
-              <a:t>all successful.</a:t>
-            </a:r>
-          </a:p>
-          <a:p>
-            <a:endParaRPr lang="en-US" altLang="zh-CN" dirty="0" smtClean="0"/>
-          </a:p>
-          <a:p>
-            <a:r>
-              <a:rPr lang="en-US" altLang="zh-CN" dirty="0" smtClean="0"/>
-              <a:t>The effectiveness </a:t>
-            </a:r>
-            <a:r>
-              <a:rPr lang="en-US" altLang="zh-CN" dirty="0" smtClean="0"/>
-              <a:t>of </a:t>
-            </a:r>
-            <a:r>
-              <a:rPr lang="en-US" altLang="zh-CN" dirty="0" smtClean="0"/>
-              <a:t>these tests </a:t>
-            </a:r>
-            <a:r>
-              <a:rPr lang="en-US" altLang="zh-CN" dirty="0" smtClean="0"/>
-              <a:t>will be proven in the next phase, when the full integration is finished</a:t>
+              <a:t>The effectiveness of these tests will be proven in the next phase, when the full integration is finished</a:t>
             </a:r>
           </a:p>
           <a:p>
@@ -5710,15 +5656,43 @@
             <p:ph idx="1"/>
           </p:nvPr>
         </p:nvSpPr>
-        <p:spPr/>
+        <p:spPr>
+          <a:xfrm>
+            <a:off x="392113" y="1198563"/>
+            <a:ext cx="4835579" cy="4894262"/>
+          </a:xfrm>
+        </p:spPr>
         <p:txBody>
           <a:bodyPr/>
           <a:lstStyle/>
           <a:p>
             <a:r>
               <a:rPr lang="en-US" altLang="zh-CN" dirty="0" smtClean="0"/>
-              <a:t>This is a basic representation of the results stored in a vector of pairs, sorted </a:t>
-            </a:r>
+              <a:t>This is a basic representation of the </a:t>
+            </a:r>
+            <a:endParaRPr lang="en-US" altLang="zh-CN" dirty="0" smtClean="0"/>
+          </a:p>
+          <a:p>
+            <a:pPr marL="0" indent="0">
+              <a:buNone/>
+            </a:pPr>
+            <a:r>
+              <a:rPr lang="en-US" altLang="zh-CN" dirty="0" smtClean="0"/>
+              <a:t>results </a:t>
+            </a:r>
+            <a:r>
+              <a:rPr lang="en-US" altLang="zh-CN" dirty="0" smtClean="0"/>
+              <a:t>stored in a vector of pairs, </a:t>
+            </a:r>
+            <a:r>
+              <a:rPr lang="en-US" altLang="zh-CN" dirty="0" smtClean="0"/>
+              <a:t>sorted </a:t>
+            </a:r>
+          </a:p>
+          <a:p>
+            <a:pPr marL="0" indent="0" algn="just">
+              <a:buNone/>
+            </a:pPr>
             <a:r>
               <a:rPr lang="en-US" altLang="zh-CN" dirty="0" err="1" smtClean="0"/>
               <a:t>descendently</a:t>
@@ -5806,6 +5780,30 @@
           </a:p>
         </p:txBody>
       </p:sp>
+      <p:pic>
+        <p:nvPicPr>
+          <p:cNvPr id="8" name="Picture 7"/>
+          <p:cNvPicPr>
+            <a:picLocks noChangeAspect="1"/>
+          </p:cNvPicPr>
+          <p:nvPr/>
+        </p:nvPicPr>
+        <p:blipFill>
+          <a:blip r:embed="rId2"/>
+          <a:stretch>
+            <a:fillRect/>
+          </a:stretch>
+        </p:blipFill>
+        <p:spPr>
+          <a:xfrm>
+            <a:off x="5227692" y="895350"/>
+            <a:ext cx="3343742" cy="5144218"/>
+          </a:xfrm>
+          <a:prstGeom prst="rect">
+            <a:avLst/>
+          </a:prstGeom>
+        </p:spPr>
+      </p:pic>
     </p:spTree>
   </p:cSld>
   <p:clrMapOvr>
@@ -5864,11 +5862,17 @@
             <p:ph idx="1"/>
           </p:nvPr>
         </p:nvSpPr>
-        <p:spPr/>
-        <p:txBody>
-          <a:bodyPr/>
-          <a:lstStyle/>
-          <a:p>
+        <p:spPr>
+          <a:xfrm>
+            <a:off x="392113" y="1198563"/>
+            <a:ext cx="4609378" cy="4894262"/>
+          </a:xfrm>
+        </p:spPr>
+        <p:txBody>
+          <a:bodyPr/>
+          <a:lstStyle/>
+          <a:p>
+            <a:pPr algn="just"/>
             <a:r>
               <a:rPr lang="en-US" altLang="zh-CN" dirty="0" smtClean="0"/>
               <a:t>The </a:t>
@@ -5879,23 +5883,15 @@
             </a:r>
             <a:r>
               <a:rPr lang="en-US" altLang="zh-CN" dirty="0" smtClean="0"/>
-              <a:t> saves outputs of the classification, converts them into result objects </a:t>
+              <a:t> saves outputs of </a:t>
             </a:r>
             <a:r>
               <a:rPr lang="en-US" altLang="zh-CN" dirty="0" smtClean="0"/>
-              <a:t>and saves </a:t>
+              <a:t>the classification</a:t>
             </a:r>
             <a:r>
               <a:rPr lang="en-US" altLang="zh-CN" dirty="0" smtClean="0"/>
-              <a:t>them into a map, directly providing access to them. It also can aggregate </a:t>
-            </a:r>
-            <a:r>
-              <a:rPr lang="en-US" altLang="zh-CN" dirty="0" smtClean="0"/>
-              <a:t>the current </a:t>
-            </a:r>
-            <a:r>
-              <a:rPr lang="en-US" altLang="zh-CN" dirty="0" smtClean="0"/>
-              <a:t>stored results.</a:t>
+              <a:t>, converts them into result objects and saves them into a map, directly providing access to them. It also can aggregate the current stored results.</a:t>
             </a:r>
           </a:p>
           <a:p>
@@ -5976,6 +5972,30 @@
           </a:p>
         </p:txBody>
       </p:sp>
+      <p:pic>
+        <p:nvPicPr>
+          <p:cNvPr id="7" name="Picture 6"/>
+          <p:cNvPicPr>
+            <a:picLocks noChangeAspect="1"/>
+          </p:cNvPicPr>
+          <p:nvPr/>
+        </p:nvPicPr>
+        <p:blipFill>
+          <a:blip r:embed="rId2"/>
+          <a:stretch>
+            <a:fillRect/>
+          </a:stretch>
+        </p:blipFill>
+        <p:spPr>
+          <a:xfrm>
+            <a:off x="5213838" y="948607"/>
+            <a:ext cx="3343742" cy="5144218"/>
+          </a:xfrm>
+          <a:prstGeom prst="rect">
+            <a:avLst/>
+          </a:prstGeom>
+        </p:spPr>
+      </p:pic>
     </p:spTree>
   </p:cSld>
   <p:clrMapOvr>
@@ -6034,22 +6054,20 @@
             <p:ph idx="1"/>
           </p:nvPr>
         </p:nvSpPr>
-        <p:spPr/>
-        <p:txBody>
-          <a:bodyPr/>
-          <a:lstStyle/>
-          <a:p>
+        <p:spPr>
+          <a:xfrm>
+            <a:off x="392113" y="1198563"/>
+            <a:ext cx="4221451" cy="4894262"/>
+          </a:xfrm>
+        </p:spPr>
+        <p:txBody>
+          <a:bodyPr/>
+          <a:lstStyle/>
+          <a:p>
+            <a:pPr algn="just"/>
             <a:r>
               <a:rPr lang="en-US" altLang="zh-CN" dirty="0" smtClean="0"/>
-              <a:t>The scheduler is responsible of providing the system with information about </a:t>
-            </a:r>
-            <a:r>
-              <a:rPr lang="en-US" altLang="zh-CN" dirty="0" smtClean="0"/>
-              <a:t>platforms it </a:t>
-            </a:r>
-            <a:r>
-              <a:rPr lang="en-US" altLang="zh-CN" dirty="0" smtClean="0"/>
-              <a:t>can run on, depending on the user’s </a:t>
+              <a:t>The scheduler is responsible of providing the system with information about platforms it can run on, depending on the user’s </a:t>
             </a:r>
             <a:r>
               <a:rPr lang="en-US" altLang="zh-CN" dirty="0" err="1" smtClean="0"/>
@@ -6138,6 +6156,30 @@
           </a:p>
         </p:txBody>
       </p:sp>
+      <p:pic>
+        <p:nvPicPr>
+          <p:cNvPr id="7" name="Picture 6"/>
+          <p:cNvPicPr>
+            <a:picLocks noChangeAspect="1"/>
+          </p:cNvPicPr>
+          <p:nvPr/>
+        </p:nvPicPr>
+        <p:blipFill>
+          <a:blip r:embed="rId2"/>
+          <a:stretch>
+            <a:fillRect/>
+          </a:stretch>
+        </p:blipFill>
+        <p:spPr>
+          <a:xfrm>
+            <a:off x="4772339" y="1048286"/>
+            <a:ext cx="3896269" cy="4706007"/>
+          </a:xfrm>
+          <a:prstGeom prst="rect">
+            <a:avLst/>
+          </a:prstGeom>
+        </p:spPr>
+      </p:pic>
     </p:spTree>
   </p:cSld>
   <p:clrMapOvr>
@@ -6297,7 +6339,7 @@
           <p:cNvPr id="6" name="Slide Number Placeholder 5">
             <a:extLst>
               <a:ext uri="{FF2B5EF4-FFF2-40B4-BE49-F238E27FC236}">
-                <a16:creationId xmlns:a16="http://schemas.microsoft.com/office/drawing/2014/main" xmlns="" id="{AC2E4B70-93C7-480F-9D6A-28A09134FF1C}"/>
+                <a16:creationId xmlns="" xmlns:a16="http://schemas.microsoft.com/office/drawing/2014/main" id="{AC2E4B70-93C7-480F-9D6A-28A09134FF1C}"/>
               </a:ext>
             </a:extLst>
           </p:cNvPr>
@@ -6327,7 +6369,7 @@
           <p:cNvPr id="10" name="页脚占位符 5">
             <a:extLst>
               <a:ext uri="{FF2B5EF4-FFF2-40B4-BE49-F238E27FC236}">
-                <a16:creationId xmlns:a16="http://schemas.microsoft.com/office/drawing/2014/main" xmlns="" id="{0F5A82ED-C254-4CDF-A0DB-D22EB18D16EC}"/>
+                <a16:creationId xmlns="" xmlns:a16="http://schemas.microsoft.com/office/drawing/2014/main" id="{0F5A82ED-C254-4CDF-A0DB-D22EB18D16EC}"/>
               </a:ext>
             </a:extLst>
           </p:cNvPr>
@@ -6488,7 +6530,7 @@
           <p:cNvPr id="3" name="Rectangle 2">
             <a:extLst>
               <a:ext uri="{FF2B5EF4-FFF2-40B4-BE49-F238E27FC236}">
-                <a16:creationId xmlns:a16="http://schemas.microsoft.com/office/drawing/2014/main" xmlns="" id="{B83E5C01-19DA-4044-9771-194439C0EBD8}"/>
+                <a16:creationId xmlns="" xmlns:a16="http://schemas.microsoft.com/office/drawing/2014/main" id="{B83E5C01-19DA-4044-9771-194439C0EBD8}"/>
               </a:ext>
             </a:extLst>
           </p:cNvPr>
@@ -6584,7 +6626,7 @@
           <p:cNvPr id="8" name="内容占位符 6">
             <a:extLst>
               <a:ext uri="{FF2B5EF4-FFF2-40B4-BE49-F238E27FC236}">
-                <a16:creationId xmlns:a16="http://schemas.microsoft.com/office/drawing/2014/main" xmlns="" id="{35F08FEC-C32D-E741-B476-8B113FA0F149}"/>
+                <a16:creationId xmlns="" xmlns:a16="http://schemas.microsoft.com/office/drawing/2014/main" id="{35F08FEC-C32D-E741-B476-8B113FA0F149}"/>
               </a:ext>
             </a:extLst>
           </p:cNvPr>
@@ -6708,7 +6750,7 @@
     </p:spTree>
     <p:extLst>
       <p:ext uri="{BB962C8B-B14F-4D97-AF65-F5344CB8AC3E}">
-        <p14:creationId xmlns:p14="http://schemas.microsoft.com/office/powerpoint/2010/main" xmlns="" val="2957859591"/>
+        <p14:creationId xmlns:p14="http://schemas.microsoft.com/office/powerpoint/2010/main" val="2957859591"/>
       </p:ext>
     </p:extLst>
   </p:cSld>
@@ -6764,7 +6806,7 @@
           <p:cNvPr id="3" name="Title 2">
             <a:extLst>
               <a:ext uri="{FF2B5EF4-FFF2-40B4-BE49-F238E27FC236}">
-                <a16:creationId xmlns:a16="http://schemas.microsoft.com/office/drawing/2014/main" xmlns="" id="{906C4C2C-591D-C447-9DC3-AB08999E305F}"/>
+                <a16:creationId xmlns="" xmlns:a16="http://schemas.microsoft.com/office/drawing/2014/main" id="{906C4C2C-591D-C447-9DC3-AB08999E305F}"/>
               </a:ext>
             </a:extLst>
           </p:cNvPr>
@@ -6799,7 +6841,7 @@
           <p:cNvPr id="10" name="内容占位符 6">
             <a:extLst>
               <a:ext uri="{FF2B5EF4-FFF2-40B4-BE49-F238E27FC236}">
-                <a16:creationId xmlns:a16="http://schemas.microsoft.com/office/drawing/2014/main" xmlns="" id="{087E18F4-B783-3E48-9BA5-5A5221748E08}"/>
+                <a16:creationId xmlns="" xmlns:a16="http://schemas.microsoft.com/office/drawing/2014/main" id="{087E18F4-B783-3E48-9BA5-5A5221748E08}"/>
               </a:ext>
             </a:extLst>
           </p:cNvPr>
@@ -6892,7 +6934,7 @@
           <p:cNvPr id="9" name="页脚占位符 5">
             <a:extLst>
               <a:ext uri="{FF2B5EF4-FFF2-40B4-BE49-F238E27FC236}">
-                <a16:creationId xmlns:a16="http://schemas.microsoft.com/office/drawing/2014/main" xmlns="" id="{7EB4266B-81DA-8B4E-9897-FEF851AB7BE3}"/>
+                <a16:creationId xmlns="" xmlns:a16="http://schemas.microsoft.com/office/drawing/2014/main" id="{7EB4266B-81DA-8B4E-9897-FEF851AB7BE3}"/>
               </a:ext>
             </a:extLst>
           </p:cNvPr>
@@ -6926,7 +6968,7 @@
     </p:spTree>
     <p:extLst>
       <p:ext uri="{BB962C8B-B14F-4D97-AF65-F5344CB8AC3E}">
-        <p14:creationId xmlns:p14="http://schemas.microsoft.com/office/powerpoint/2010/main" xmlns="" val="2965456205"/>
+        <p14:creationId xmlns:p14="http://schemas.microsoft.com/office/powerpoint/2010/main" val="2965456205"/>
       </p:ext>
     </p:extLst>
   </p:cSld>
@@ -7004,67 +7046,26 @@
           <a:p>
             <a:r>
               <a:rPr lang="en-US" altLang="zh-CN" dirty="0" smtClean="0"/>
-              <a:t>Used </a:t>
-            </a:r>
+              <a:t>Used two different ways of building and compiling GUI and back-end</a:t>
+            </a:r>
+          </a:p>
+          <a:p>
+            <a:endParaRPr lang="en-US" altLang="zh-CN" dirty="0" smtClean="0"/>
+          </a:p>
+          <a:p>
             <a:r>
               <a:rPr lang="en-US" altLang="zh-CN" dirty="0" smtClean="0"/>
-              <a:t>two different ways of building and compiling </a:t>
-            </a:r>
+              <a:t>Trying to make both of the GUI and classification run on eclipse</a:t>
+            </a:r>
+          </a:p>
+          <a:p>
+            <a:endParaRPr lang="en-US" altLang="zh-CN" dirty="0" smtClean="0"/>
+          </a:p>
+          <a:p>
             <a:r>
               <a:rPr lang="en-US" altLang="zh-CN" dirty="0" smtClean="0"/>
-              <a:t>GUI and back-end</a:t>
-            </a:r>
-          </a:p>
-          <a:p>
-            <a:endParaRPr lang="en-US" altLang="zh-CN" dirty="0" smtClean="0"/>
-          </a:p>
-          <a:p>
-            <a:r>
-              <a:rPr lang="en-US" altLang="zh-CN" dirty="0" smtClean="0"/>
-              <a:t>Trying </a:t>
-            </a:r>
-            <a:r>
-              <a:rPr lang="en-US" altLang="zh-CN" dirty="0" smtClean="0"/>
-              <a:t>to make both of the GUI and classification run on </a:t>
-            </a:r>
-            <a:r>
-              <a:rPr lang="en-US" altLang="zh-CN" dirty="0" smtClean="0"/>
-              <a:t>eclipse</a:t>
-            </a:r>
-          </a:p>
-          <a:p>
-            <a:endParaRPr lang="en-US" altLang="zh-CN" dirty="0" smtClean="0"/>
-          </a:p>
-          <a:p>
-            <a:r>
-              <a:rPr lang="en-US" altLang="zh-CN" dirty="0" smtClean="0"/>
-              <a:t>Have made </a:t>
-            </a:r>
-            <a:r>
-              <a:rPr lang="en-US" altLang="zh-CN" dirty="0" smtClean="0"/>
-              <a:t>a big step in this </a:t>
-            </a:r>
-            <a:r>
-              <a:rPr lang="en-US" altLang="zh-CN" dirty="0" smtClean="0"/>
-              <a:t>direction, since </a:t>
-            </a:r>
-            <a:r>
-              <a:rPr lang="en-US" altLang="zh-CN" dirty="0" smtClean="0"/>
-              <a:t>basic GUI’s are now running on eclipse, however we still have compiling errors </a:t>
-            </a:r>
-            <a:r>
-              <a:rPr lang="en-US" altLang="zh-CN" dirty="0" smtClean="0"/>
-              <a:t>when merging </a:t>
-            </a:r>
-            <a:r>
-              <a:rPr lang="en-US" altLang="zh-CN" dirty="0" smtClean="0"/>
-              <a:t>both of the main </a:t>
-            </a:r>
-            <a:r>
-              <a:rPr lang="en-US" altLang="zh-CN" dirty="0" smtClean="0"/>
-              <a:t>projects</a:t>
-            </a:r>
-            <a:endParaRPr lang="en-US" altLang="zh-CN" dirty="0" smtClean="0"/>
+              <a:t>Have made a big step in this direction, since basic GUI’s are now running on eclipse, however we still have compiling errors when merging both of the main projects</a:t>
+            </a:r>
           </a:p>
           <a:p>
             <a:endParaRPr lang="zh-CN" altLang="en-US" dirty="0"/>
@@ -7223,7 +7224,7 @@
           <p:cNvPr id="8" name="Title 7">
             <a:extLst>
               <a:ext uri="{FF2B5EF4-FFF2-40B4-BE49-F238E27FC236}">
-                <a16:creationId xmlns:a16="http://schemas.microsoft.com/office/drawing/2014/main" xmlns="" id="{3FFF9DAF-9AF8-FA4C-88CC-53ACBEB0E36B}"/>
+                <a16:creationId xmlns="" xmlns:a16="http://schemas.microsoft.com/office/drawing/2014/main" id="{3FFF9DAF-9AF8-FA4C-88CC-53ACBEB0E36B}"/>
               </a:ext>
             </a:extLst>
           </p:cNvPr>
@@ -7258,7 +7259,7 @@
           <p:cNvPr id="7" name="内容占位符 6">
             <a:extLst>
               <a:ext uri="{FF2B5EF4-FFF2-40B4-BE49-F238E27FC236}">
-                <a16:creationId xmlns:a16="http://schemas.microsoft.com/office/drawing/2014/main" xmlns="" id="{8CF34D27-70B7-EA43-87F0-266AC80161F2}"/>
+                <a16:creationId xmlns="" xmlns:a16="http://schemas.microsoft.com/office/drawing/2014/main" id="{8CF34D27-70B7-EA43-87F0-266AC80161F2}"/>
               </a:ext>
             </a:extLst>
           </p:cNvPr>
@@ -7321,7 +7322,7 @@
           <p:cNvPr id="4" name="Picture 3" descr="A screenshot of a cell phone&#10;&#10;Description automatically generated">
             <a:extLst>
               <a:ext uri="{FF2B5EF4-FFF2-40B4-BE49-F238E27FC236}">
-                <a16:creationId xmlns:a16="http://schemas.microsoft.com/office/drawing/2014/main" xmlns="" id="{B0582344-20BF-C24F-B9D6-E621FCE647A4}"/>
+                <a16:creationId xmlns="" xmlns:a16="http://schemas.microsoft.com/office/drawing/2014/main" id="{B0582344-20BF-C24F-B9D6-E621FCE647A4}"/>
               </a:ext>
             </a:extLst>
           </p:cNvPr>
@@ -7334,10 +7335,10 @@
           <a:blip r:embed="rId2" cstate="print">
             <a:extLst>
               <a:ext uri="{28A0092B-C50C-407E-A947-70E740481C1C}">
-                <a14:useLocalDpi xmlns:a14="http://schemas.microsoft.com/office/drawing/2010/main" xmlns="" val="0"/>
+                <a14:useLocalDpi xmlns:a14="http://schemas.microsoft.com/office/drawing/2010/main" val="0"/>
               </a:ext>
               <a:ext uri="{837473B0-CC2E-450A-ABE3-18F120FF3D39}">
-                <a1611:picAttrSrcUrl xmlns:a1611="http://schemas.microsoft.com/office/drawing/2016/11/main" xmlns="" r:id="rId3"/>
+                <a1611:picAttrSrcUrl xmlns="" xmlns:a1611="http://schemas.microsoft.com/office/drawing/2016/11/main" r:id="rId3"/>
               </a:ext>
             </a:extLst>
           </a:blip>
@@ -7360,7 +7361,7 @@
           <p:cNvPr id="10" name="TextBox 9">
             <a:extLst>
               <a:ext uri="{FF2B5EF4-FFF2-40B4-BE49-F238E27FC236}">
-                <a16:creationId xmlns:a16="http://schemas.microsoft.com/office/drawing/2014/main" xmlns="" id="{E70C0FA5-9C50-9D4C-BE1F-65C4810A2E8A}"/>
+                <a16:creationId xmlns="" xmlns:a16="http://schemas.microsoft.com/office/drawing/2014/main" id="{E70C0FA5-9C50-9D4C-BE1F-65C4810A2E8A}"/>
               </a:ext>
             </a:extLst>
           </p:cNvPr>
@@ -7457,7 +7458,7 @@
           <p:cNvPr id="8" name="页脚占位符 5">
             <a:extLst>
               <a:ext uri="{FF2B5EF4-FFF2-40B4-BE49-F238E27FC236}">
-                <a16:creationId xmlns:a16="http://schemas.microsoft.com/office/drawing/2014/main" xmlns="" id="{D5792DCF-CD73-DE46-AD36-94B530B18B81}"/>
+                <a16:creationId xmlns="" xmlns:a16="http://schemas.microsoft.com/office/drawing/2014/main" id="{D5792DCF-CD73-DE46-AD36-94B530B18B81}"/>
               </a:ext>
             </a:extLst>
           </p:cNvPr>
@@ -7493,7 +7494,7 @@
           <p:cNvPr id="6" name="内容占位符 6">
             <a:extLst>
               <a:ext uri="{FF2B5EF4-FFF2-40B4-BE49-F238E27FC236}">
-                <a16:creationId xmlns:a16="http://schemas.microsoft.com/office/drawing/2014/main" xmlns="" id="{53EF04C9-CAD7-5543-B52F-E2A893362F92}"/>
+                <a16:creationId xmlns="" xmlns:a16="http://schemas.microsoft.com/office/drawing/2014/main" id="{53EF04C9-CAD7-5543-B52F-E2A893362F92}"/>
               </a:ext>
             </a:extLst>
           </p:cNvPr>
@@ -7576,7 +7577,7 @@
           <p:cNvPr id="2" name="TextBox 1">
             <a:extLst>
               <a:ext uri="{FF2B5EF4-FFF2-40B4-BE49-F238E27FC236}">
-                <a16:creationId xmlns:a16="http://schemas.microsoft.com/office/drawing/2014/main" xmlns="" id="{E7146F02-26A4-0349-A018-604DFA7C7416}"/>
+                <a16:creationId xmlns="" xmlns:a16="http://schemas.microsoft.com/office/drawing/2014/main" id="{E7146F02-26A4-0349-A018-604DFA7C7416}"/>
               </a:ext>
             </a:extLst>
           </p:cNvPr>
@@ -7613,7 +7614,7 @@
     </p:spTree>
     <p:extLst>
       <p:ext uri="{BB962C8B-B14F-4D97-AF65-F5344CB8AC3E}">
-        <p14:creationId xmlns:p14="http://schemas.microsoft.com/office/powerpoint/2010/main" xmlns="" val="3258145843"/>
+        <p14:creationId xmlns:p14="http://schemas.microsoft.com/office/powerpoint/2010/main" val="3258145843"/>
       </p:ext>
     </p:extLst>
   </p:cSld>
@@ -7818,11 +7819,7 @@
           <a:p>
             <a:r>
               <a:rPr lang="en-US" altLang="zh-CN" dirty="0" smtClean="0"/>
-              <a:t>The </a:t>
-            </a:r>
-            <a:r>
-              <a:rPr lang="en-US" altLang="zh-CN" dirty="0" smtClean="0"/>
-              <a:t>constructor of Network loads the layers from a configuration file through </a:t>
+              <a:t>The constructor of Network loads the layers from a configuration file through </a:t>
             </a:r>
             <a:r>
               <a:rPr lang="en-US" altLang="zh-CN" dirty="0" err="1" smtClean="0"/>
@@ -7830,15 +7827,7 @@
             </a:r>
             <a:r>
               <a:rPr lang="en-US" altLang="zh-CN" dirty="0" smtClean="0"/>
-              <a:t> </a:t>
-            </a:r>
-            <a:r>
-              <a:rPr lang="en-US" altLang="zh-CN" dirty="0" smtClean="0"/>
-              <a:t>parser. Therefore</a:t>
-            </a:r>
-            <a:r>
-              <a:rPr lang="en-US" altLang="zh-CN" dirty="0" smtClean="0"/>
-              <a:t>, tests were run to check if these layers are properly loaded in the class.</a:t>
+              <a:t> parser. Therefore, tests were run to check if these layers are properly loaded in the class.</a:t>
             </a:r>
           </a:p>
           <a:p>
@@ -8127,27 +8116,7 @@
             </a:r>
             <a:r>
               <a:rPr lang="en-US" altLang="zh-CN" dirty="0" smtClean="0"/>
-              <a:t> </a:t>
-            </a:r>
-            <a:r>
-              <a:rPr lang="en-US" altLang="zh-CN" dirty="0" smtClean="0"/>
-              <a:t>was used to access functions which made the network model easier to </a:t>
-            </a:r>
-            <a:r>
-              <a:rPr lang="en-US" altLang="zh-CN" dirty="0" smtClean="0"/>
-              <a:t>implement, since </a:t>
-            </a:r>
-            <a:r>
-              <a:rPr lang="en-US" altLang="zh-CN" dirty="0" smtClean="0"/>
-              <a:t>it offers parsing methods to fill each layer with its proper fields. It also provided </a:t>
-            </a:r>
-            <a:r>
-              <a:rPr lang="en-US" altLang="zh-CN" dirty="0" smtClean="0"/>
-              <a:t>as the </a:t>
-            </a:r>
-            <a:r>
-              <a:rPr lang="en-US" altLang="zh-CN" dirty="0" smtClean="0"/>
-              <a:t>weights.</a:t>
+              <a:t> was used to access functions which made the network model easier to implement, since it offers parsing methods to fill each layer with its proper fields. It also provided as the weights.</a:t>
             </a:r>
           </a:p>
           <a:p>

</xml_diff>